<commit_message>
Issue 85: Change gif background from orange to white Update Issue 85
</commit_message>
<xml_diff>
--- a/doc/Highlight points gif.pptx
+++ b/doc/Highlight points gif.pptx
@@ -295,7 +295,7 @@
           <a:p>
             <a:fld id="{1C243D36-5217-48BF-A097-7AA0FC8B35E5}" type="datetimeFigureOut">
               <a:rPr lang="en-US" smtClean="0"/>
-              <a:t>12/15/2013</a:t>
+              <a:t>12/25/2013</a:t>
             </a:fld>
             <a:endParaRPr lang="en-US"/>
           </a:p>
@@ -465,7 +465,7 @@
           <a:p>
             <a:fld id="{1C243D36-5217-48BF-A097-7AA0FC8B35E5}" type="datetimeFigureOut">
               <a:rPr lang="en-US" smtClean="0"/>
-              <a:t>12/15/2013</a:t>
+              <a:t>12/25/2013</a:t>
             </a:fld>
             <a:endParaRPr lang="en-US"/>
           </a:p>
@@ -645,7 +645,7 @@
           <a:p>
             <a:fld id="{1C243D36-5217-48BF-A097-7AA0FC8B35E5}" type="datetimeFigureOut">
               <a:rPr lang="en-US" smtClean="0"/>
-              <a:t>12/15/2013</a:t>
+              <a:t>12/25/2013</a:t>
             </a:fld>
             <a:endParaRPr lang="en-US"/>
           </a:p>
@@ -815,7 +815,7 @@
           <a:p>
             <a:fld id="{1C243D36-5217-48BF-A097-7AA0FC8B35E5}" type="datetimeFigureOut">
               <a:rPr lang="en-US" smtClean="0"/>
-              <a:t>12/15/2013</a:t>
+              <a:t>12/25/2013</a:t>
             </a:fld>
             <a:endParaRPr lang="en-US"/>
           </a:p>
@@ -1068,7 +1068,7 @@
           <a:p>
             <a:fld id="{1C243D36-5217-48BF-A097-7AA0FC8B35E5}" type="datetimeFigureOut">
               <a:rPr lang="en-US" smtClean="0"/>
-              <a:t>12/15/2013</a:t>
+              <a:t>12/25/2013</a:t>
             </a:fld>
             <a:endParaRPr lang="en-US"/>
           </a:p>
@@ -1356,7 +1356,7 @@
           <a:p>
             <a:fld id="{1C243D36-5217-48BF-A097-7AA0FC8B35E5}" type="datetimeFigureOut">
               <a:rPr lang="en-US" smtClean="0"/>
-              <a:t>12/15/2013</a:t>
+              <a:t>12/25/2013</a:t>
             </a:fld>
             <a:endParaRPr lang="en-US"/>
           </a:p>
@@ -1783,7 +1783,7 @@
           <a:p>
             <a:fld id="{1C243D36-5217-48BF-A097-7AA0FC8B35E5}" type="datetimeFigureOut">
               <a:rPr lang="en-US" smtClean="0"/>
-              <a:t>12/15/2013</a:t>
+              <a:t>12/25/2013</a:t>
             </a:fld>
             <a:endParaRPr lang="en-US"/>
           </a:p>
@@ -1901,7 +1901,7 @@
           <a:p>
             <a:fld id="{1C243D36-5217-48BF-A097-7AA0FC8B35E5}" type="datetimeFigureOut">
               <a:rPr lang="en-US" smtClean="0"/>
-              <a:t>12/15/2013</a:t>
+              <a:t>12/25/2013</a:t>
             </a:fld>
             <a:endParaRPr lang="en-US"/>
           </a:p>
@@ -1996,7 +1996,7 @@
           <a:p>
             <a:fld id="{1C243D36-5217-48BF-A097-7AA0FC8B35E5}" type="datetimeFigureOut">
               <a:rPr lang="en-US" smtClean="0"/>
-              <a:t>12/15/2013</a:t>
+              <a:t>12/25/2013</a:t>
             </a:fld>
             <a:endParaRPr lang="en-US"/>
           </a:p>
@@ -2273,7 +2273,7 @@
           <a:p>
             <a:fld id="{1C243D36-5217-48BF-A097-7AA0FC8B35E5}" type="datetimeFigureOut">
               <a:rPr lang="en-US" smtClean="0"/>
-              <a:t>12/15/2013</a:t>
+              <a:t>12/25/2013</a:t>
             </a:fld>
             <a:endParaRPr lang="en-US"/>
           </a:p>
@@ -2526,7 +2526,7 @@
           <a:p>
             <a:fld id="{1C243D36-5217-48BF-A097-7AA0FC8B35E5}" type="datetimeFigureOut">
               <a:rPr lang="en-US" smtClean="0"/>
-              <a:t>12/15/2013</a:t>
+              <a:t>12/25/2013</a:t>
             </a:fld>
             <a:endParaRPr lang="en-US"/>
           </a:p>
@@ -2593,10 +2593,7 @@
     <p:bg>
       <p:bgPr>
         <a:solidFill>
-          <a:schemeClr val="accent6">
-            <a:lumMod val="40000"/>
-            <a:lumOff val="60000"/>
-          </a:schemeClr>
+          <a:schemeClr val="bg1"/>
         </a:solidFill>
         <a:effectLst/>
       </p:bgPr>
@@ -2745,7 +2742,7 @@
           <a:p>
             <a:fld id="{1C243D36-5217-48BF-A097-7AA0FC8B35E5}" type="datetimeFigureOut">
               <a:rPr lang="en-US" smtClean="0"/>
-              <a:t>12/15/2013</a:t>
+              <a:t>12/25/2013</a:t>
             </a:fld>
             <a:endParaRPr lang="en-US"/>
           </a:p>
@@ -2825,6 +2822,54 @@
               <a:rPr lang="en-US" smtClean="0"/>
               <a:t>‹#›</a:t>
             </a:fld>
+            <a:endParaRPr lang="en-US"/>
+          </a:p>
+        </p:txBody>
+      </p:sp>
+      <p:sp>
+        <p:nvSpPr>
+          <p:cNvPr id="7" name="Rectangle 6"/>
+          <p:cNvSpPr/>
+          <p:nvPr userDrawn="1"/>
+        </p:nvSpPr>
+        <p:spPr>
+          <a:xfrm>
+            <a:off x="-1" y="0"/>
+            <a:ext cx="3648456" cy="2734056"/>
+          </a:xfrm>
+          <a:prstGeom prst="rect">
+            <a:avLst/>
+          </a:prstGeom>
+          <a:noFill/>
+          <a:ln>
+            <a:solidFill>
+              <a:schemeClr val="bg1">
+                <a:lumMod val="75000"/>
+              </a:schemeClr>
+            </a:solidFill>
+          </a:ln>
+        </p:spPr>
+        <p:style>
+          <a:lnRef idx="2">
+            <a:schemeClr val="accent1">
+              <a:shade val="50000"/>
+            </a:schemeClr>
+          </a:lnRef>
+          <a:fillRef idx="1">
+            <a:schemeClr val="accent1"/>
+          </a:fillRef>
+          <a:effectRef idx="0">
+            <a:schemeClr val="accent1"/>
+          </a:effectRef>
+          <a:fontRef idx="minor">
+            <a:schemeClr val="lt1"/>
+          </a:fontRef>
+        </p:style>
+        <p:txBody>
+          <a:bodyPr rtlCol="0" anchor="ctr"/>
+          <a:lstStyle/>
+          <a:p>
+            <a:pPr algn="ctr"/>
             <a:endParaRPr lang="en-US"/>
           </a:p>
         </p:txBody>
@@ -3475,11 +3520,11 @@
   <p:clrMapOvr>
     <a:masterClrMapping/>
   </p:clrMapOvr>
-  <mc:AlternateContent xmlns:mc="http://schemas.openxmlformats.org/markup-compatibility/2006">
-    <mc:Choice xmlns:p14="http://schemas.microsoft.com/office/powerpoint/2010/main" Requires="p14">
+  <mc:AlternateContent xmlns:mc="http://schemas.openxmlformats.org/markup-compatibility/2006" xmlns:p14="http://schemas.microsoft.com/office/powerpoint/2010/main">
+    <mc:Choice Requires="p14">
       <p:transition spd="slow" p14:dur="2000" advTm="1000"/>
     </mc:Choice>
-    <mc:Fallback>
+    <mc:Fallback xmlns="">
       <p:transition spd="slow" advTm="1000"/>
     </mc:Fallback>
   </mc:AlternateContent>
@@ -3888,11 +3933,11 @@
   <p:clrMapOvr>
     <a:masterClrMapping/>
   </p:clrMapOvr>
-  <mc:AlternateContent xmlns:mc="http://schemas.openxmlformats.org/markup-compatibility/2006">
-    <mc:Choice xmlns:p14="http://schemas.microsoft.com/office/powerpoint/2010/main" Requires="p14">
+  <mc:AlternateContent xmlns:mc="http://schemas.openxmlformats.org/markup-compatibility/2006" xmlns:p14="http://schemas.microsoft.com/office/powerpoint/2010/main">
+    <mc:Choice Requires="p14">
       <p:transition spd="slow" p14:dur="2000" advClick="0" advTm="0"/>
     </mc:Choice>
-    <mc:Fallback>
+    <mc:Fallback xmlns="">
       <p:transition spd="slow" advClick="0" advTm="0"/>
     </mc:Fallback>
   </mc:AlternateContent>
@@ -4386,11 +4431,11 @@
   <p:clrMapOvr>
     <a:masterClrMapping/>
   </p:clrMapOvr>
-  <mc:AlternateContent xmlns:mc="http://schemas.openxmlformats.org/markup-compatibility/2006">
-    <mc:Choice xmlns:p14="http://schemas.microsoft.com/office/powerpoint/2010/main" Requires="p14">
+  <mc:AlternateContent xmlns:mc="http://schemas.openxmlformats.org/markup-compatibility/2006" xmlns:p14="http://schemas.microsoft.com/office/powerpoint/2010/main">
+    <mc:Choice Requires="p14">
       <p:transition spd="slow" p14:dur="2000" advTm="1000"/>
     </mc:Choice>
-    <mc:Fallback>
+    <mc:Fallback xmlns="">
       <p:transition spd="slow" advTm="1000"/>
     </mc:Fallback>
   </mc:AlternateContent>
@@ -4799,11 +4844,11 @@
   <p:clrMapOvr>
     <a:masterClrMapping/>
   </p:clrMapOvr>
-  <mc:AlternateContent xmlns:mc="http://schemas.openxmlformats.org/markup-compatibility/2006">
-    <mc:Choice xmlns:p14="http://schemas.microsoft.com/office/powerpoint/2010/main" Requires="p14">
+  <mc:AlternateContent xmlns:mc="http://schemas.openxmlformats.org/markup-compatibility/2006" xmlns:p14="http://schemas.microsoft.com/office/powerpoint/2010/main">
+    <mc:Choice Requires="p14">
       <p:transition spd="slow" p14:dur="2000" advClick="0" advTm="0"/>
     </mc:Choice>
-    <mc:Fallback>
+    <mc:Fallback xmlns="">
       <p:transition spd="slow" advClick="0" advTm="0"/>
     </mc:Fallback>
   </mc:AlternateContent>
@@ -5297,11 +5342,11 @@
   <p:clrMapOvr>
     <a:masterClrMapping/>
   </p:clrMapOvr>
-  <mc:AlternateContent xmlns:mc="http://schemas.openxmlformats.org/markup-compatibility/2006">
-    <mc:Choice xmlns:p14="http://schemas.microsoft.com/office/powerpoint/2010/main" Requires="p14">
+  <mc:AlternateContent xmlns:mc="http://schemas.openxmlformats.org/markup-compatibility/2006" xmlns:p14="http://schemas.microsoft.com/office/powerpoint/2010/main">
+    <mc:Choice Requires="p14">
       <p:transition spd="slow" p14:dur="2000" advTm="1000"/>
     </mc:Choice>
-    <mc:Fallback>
+    <mc:Fallback xmlns="">
       <p:transition spd="slow" advTm="1000"/>
     </mc:Fallback>
   </mc:AlternateContent>
@@ -5710,11 +5755,11 @@
   <p:clrMapOvr>
     <a:masterClrMapping/>
   </p:clrMapOvr>
-  <mc:AlternateContent xmlns:mc="http://schemas.openxmlformats.org/markup-compatibility/2006">
-    <mc:Choice xmlns:p14="http://schemas.microsoft.com/office/powerpoint/2010/main" Requires="p14">
+  <mc:AlternateContent xmlns:mc="http://schemas.openxmlformats.org/markup-compatibility/2006" xmlns:p14="http://schemas.microsoft.com/office/powerpoint/2010/main">
+    <mc:Choice Requires="p14">
       <p:transition spd="slow" p14:dur="2000" advClick="0" advTm="0"/>
     </mc:Choice>
-    <mc:Fallback>
+    <mc:Fallback xmlns="">
       <p:transition spd="slow" advClick="0" advTm="0"/>
     </mc:Fallback>
   </mc:AlternateContent>
@@ -6208,11 +6253,11 @@
   <p:clrMapOvr>
     <a:masterClrMapping/>
   </p:clrMapOvr>
-  <mc:AlternateContent xmlns:mc="http://schemas.openxmlformats.org/markup-compatibility/2006">
-    <mc:Choice xmlns:p14="http://schemas.microsoft.com/office/powerpoint/2010/main" Requires="p14">
+  <mc:AlternateContent xmlns:mc="http://schemas.openxmlformats.org/markup-compatibility/2006" xmlns:p14="http://schemas.microsoft.com/office/powerpoint/2010/main">
+    <mc:Choice Requires="p14">
       <p:transition spd="slow" p14:dur="2000" advTm="1000"/>
     </mc:Choice>
-    <mc:Fallback>
+    <mc:Fallback xmlns="">
       <p:transition spd="slow" advTm="1000"/>
     </mc:Fallback>
   </mc:AlternateContent>

</xml_diff>